<commit_message>
Revert "Merge branch 'HS-branch'"
This reverts commit 71b0efbe76e13b3f57bc323d87ebc77f59850fbb, reversing
changes made to 435914dd1edab3ec889afc168131ee5fdf2c6ef5.
</commit_message>
<xml_diff>
--- a/기획서/버스타그램_화면설계서.pptx
+++ b/기획서/버스타그램_화면설계서.pptx
@@ -3024,6 +3024,7 @@
               <a:rPr lang="en-US" altLang="ko-KR" sz="10000" dirty="0" smtClean="0"/>
               <a:t> </a:t>
             </a:r>
+            <a:endParaRPr lang="en-US" altLang="ko-KR" sz="10000" dirty="0" smtClean="0"/>
           </a:p>
           <a:p>
             <a:pPr algn="ctr"/>
@@ -14076,7 +14077,7 @@
         </p:nvSpPr>
         <p:spPr>
           <a:xfrm>
-            <a:off x="510989" y="4405986"/>
+            <a:off x="279069" y="4478040"/>
             <a:ext cx="2949239" cy="369332"/>
           </a:xfrm>
           <a:prstGeom prst="rect">
@@ -14142,7 +14143,7 @@
         </p:nvSpPr>
         <p:spPr>
           <a:xfrm>
-            <a:off x="1575589" y="498137"/>
+            <a:off x="1708781" y="570988"/>
             <a:ext cx="3440438" cy="477054"/>
           </a:xfrm>
           <a:prstGeom prst="rect">
@@ -16386,8 +16387,8 @@
         </p:nvCxnSpPr>
         <p:spPr>
           <a:xfrm flipH="1">
-            <a:off x="-492991" y="4590652"/>
-            <a:ext cx="1003980" cy="106067"/>
+            <a:off x="-492991" y="4662706"/>
+            <a:ext cx="772060" cy="34013"/>
           </a:xfrm>
           <a:prstGeom prst="straightConnector1">
             <a:avLst/>

</xml_diff>

<commit_message>
Revert "Revert "Merge branch 'HS-branch'""
This reverts commit fcc30e66abb32a2f31c7103ced1f6951837b0d61.
</commit_message>
<xml_diff>
--- a/기획서/버스타그램_화면설계서.pptx
+++ b/기획서/버스타그램_화면설계서.pptx
@@ -3024,7 +3024,6 @@
               <a:rPr lang="en-US" altLang="ko-KR" sz="10000" dirty="0" smtClean="0"/>
               <a:t> </a:t>
             </a:r>
-            <a:endParaRPr lang="en-US" altLang="ko-KR" sz="10000" dirty="0" smtClean="0"/>
           </a:p>
           <a:p>
             <a:pPr algn="ctr"/>
@@ -14077,7 +14076,7 @@
         </p:nvSpPr>
         <p:spPr>
           <a:xfrm>
-            <a:off x="279069" y="4478040"/>
+            <a:off x="510989" y="4405986"/>
             <a:ext cx="2949239" cy="369332"/>
           </a:xfrm>
           <a:prstGeom prst="rect">
@@ -14143,7 +14142,7 @@
         </p:nvSpPr>
         <p:spPr>
           <a:xfrm>
-            <a:off x="1708781" y="570988"/>
+            <a:off x="1575589" y="498137"/>
             <a:ext cx="3440438" cy="477054"/>
           </a:xfrm>
           <a:prstGeom prst="rect">
@@ -16387,8 +16386,8 @@
         </p:nvCxnSpPr>
         <p:spPr>
           <a:xfrm flipH="1">
-            <a:off x="-492991" y="4662706"/>
-            <a:ext cx="772060" cy="34013"/>
+            <a:off x="-492991" y="4590652"/>
+            <a:ext cx="1003980" cy="106067"/>
           </a:xfrm>
           <a:prstGeom prst="straightConnector1">
             <a:avLst/>

</xml_diff>